<commit_message>
New changes in FileSystem and PacketManager
</commit_message>
<xml_diff>
--- a/docs/Assignment_I_v2.0.pptx
+++ b/docs/Assignment_I_v2.0.pptx
@@ -203,7 +203,7 @@
             <a:fld id="{37303B11-5EFE-4A3B-B7C0-4ADE873E5104}" type="datetimeFigureOut">
               <a:rPr lang="fi-FI" smtClean="0"/>
               <a:pPr/>
-              <a:t>17.2.2012</a:t>
+              <a:t>14.3.2012</a:t>
             </a:fld>
             <a:endParaRPr lang="fi-FI" dirty="0"/>
           </a:p>
@@ -747,7 +747,7 @@
             <a:fld id="{87EC39D0-1417-4A77-90FE-7D5DB4D349D1}" type="datetime1">
               <a:rPr lang="en-US" noProof="0" smtClean="0"/>
               <a:pPr/>
-              <a:t>2/17/2012</a:t>
+              <a:t>3/14/2012</a:t>
             </a:fld>
             <a:endParaRPr lang="en-US" noProof="0" dirty="0"/>
           </a:p>
@@ -1209,7 +1209,7 @@
             <a:fld id="{4FAEA9CF-1587-4B25-83A1-F4D307547DD7}" type="datetime1">
               <a:rPr lang="en-US" noProof="0" smtClean="0"/>
               <a:pPr/>
-              <a:t>2/17/2012</a:t>
+              <a:t>3/14/2012</a:t>
             </a:fld>
             <a:endParaRPr lang="en-US" noProof="0" dirty="0"/>
           </a:p>
@@ -1696,7 +1696,7 @@
             <a:fld id="{09B7A1AD-2F7E-498C-93D9-C64CA4A98AC2}" type="datetime1">
               <a:rPr lang="en-US" noProof="0" smtClean="0"/>
               <a:pPr/>
-              <a:t>2/17/2012</a:t>
+              <a:t>3/14/2012</a:t>
             </a:fld>
             <a:endParaRPr lang="en-US" noProof="0" dirty="0"/>
           </a:p>
@@ -2011,7 +2011,7 @@
             <a:fld id="{14372280-3F68-4E82-99C9-069F6B492729}" type="datetime1">
               <a:rPr lang="en-US" noProof="0" smtClean="0"/>
               <a:pPr/>
-              <a:t>2/17/2012</a:t>
+              <a:t>3/14/2012</a:t>
             </a:fld>
             <a:endParaRPr lang="en-US" noProof="0" dirty="0"/>
           </a:p>
@@ -2303,7 +2303,7 @@
             <a:fld id="{A9D62979-0F3A-4E9A-8E49-B99BF5FA8E4D}" type="datetime1">
               <a:rPr lang="en-US" noProof="0" smtClean="0"/>
               <a:pPr/>
-              <a:t>2/17/2012</a:t>
+              <a:t>3/14/2012</a:t>
             </a:fld>
             <a:endParaRPr lang="en-US" noProof="0" dirty="0"/>
           </a:p>
@@ -2675,7 +2675,7 @@
             <a:fld id="{12FBD417-E590-4670-8BC6-C20EB48C3843}" type="datetime1">
               <a:rPr lang="en-US" noProof="0" smtClean="0"/>
               <a:pPr/>
-              <a:t>2/17/2012</a:t>
+              <a:t>3/14/2012</a:t>
             </a:fld>
             <a:endParaRPr lang="en-US" noProof="0" dirty="0"/>
           </a:p>
@@ -3160,7 +3160,7 @@
             <a:fld id="{35D187A0-71E3-479A-A733-F7ABB2D097A9}" type="datetime1">
               <a:rPr lang="en-US" noProof="0" smtClean="0"/>
               <a:pPr/>
-              <a:t>2/17/2012</a:t>
+              <a:t>3/14/2012</a:t>
             </a:fld>
             <a:endParaRPr lang="en-US" noProof="0" dirty="0"/>
           </a:p>
@@ -3655,7 +3655,7 @@
             <a:fld id="{6DFA4BB0-E6E1-415F-87CF-1F68CDC1B8BC}" type="datetime1">
               <a:rPr lang="en-US" noProof="0" smtClean="0"/>
               <a:pPr/>
-              <a:t>2/17/2012</a:t>
+              <a:t>3/14/2012</a:t>
             </a:fld>
             <a:endParaRPr lang="en-US" noProof="0" dirty="0"/>
           </a:p>
@@ -4092,7 +4092,7 @@
             <a:fld id="{0B97DFF3-714A-4360-8E9A-527415C76690}" type="datetime1">
               <a:rPr lang="en-US" noProof="0" smtClean="0"/>
               <a:pPr/>
-              <a:t>2/17/2012</a:t>
+              <a:t>3/14/2012</a:t>
             </a:fld>
             <a:endParaRPr lang="en-US" noProof="0" dirty="0"/>
           </a:p>
@@ -6653,14 +6653,6 @@
                 </a:rPr>
                 <a:t>-ID</a:t>
               </a:r>
-              <a:endParaRPr lang="en-US" sz="1050" b="1" dirty="0" smtClean="0">
-                <a:solidFill>
-                  <a:schemeClr val="accent6">
-                    <a:lumMod val="50000"/>
-                  </a:schemeClr>
-                </a:solidFill>
-                <a:latin typeface="Calibri" pitchFamily="34" charset="0"/>
-              </a:endParaRPr>
             </a:p>
           </p:txBody>
         </p:sp>
@@ -6792,18 +6784,7 @@
                   </a:solidFill>
                   <a:latin typeface="Calibri" pitchFamily="34" charset="0"/>
                 </a:rPr>
-                <a:t> + Chunk size</a:t>
-              </a:r>
-              <a:r>
-                <a:rPr lang="en-US" sz="1050" b="1" dirty="0" smtClean="0">
-                  <a:solidFill>
-                    <a:schemeClr val="accent6">
-                      <a:lumMod val="50000"/>
-                    </a:schemeClr>
-                  </a:solidFill>
-                  <a:latin typeface="Calibri" pitchFamily="34" charset="0"/>
-                </a:rPr>
-                <a:t>} + Local-</a:t>
+                <a:t> + Chunk size} + Local-</a:t>
               </a:r>
               <a:r>
                 <a:rPr lang="en-US" sz="1050" b="1" dirty="0" err="1" smtClean="0">
@@ -6827,14 +6808,6 @@
                 </a:rPr>
                 <a:t>-ID</a:t>
               </a:r>
-              <a:endParaRPr lang="en-US" sz="1050" b="1" dirty="0" smtClean="0">
-                <a:solidFill>
-                  <a:schemeClr val="accent6">
-                    <a:lumMod val="50000"/>
-                  </a:schemeClr>
-                </a:solidFill>
-                <a:latin typeface="Calibri" pitchFamily="34" charset="0"/>
-              </a:endParaRPr>
             </a:p>
           </p:txBody>
         </p:sp>
@@ -7076,12 +7049,6 @@
                 </a:rPr>
                 <a:t>Specify the complete procedure</a:t>
               </a:r>
-              <a:endParaRPr lang="en-US" sz="1100" dirty="0" smtClean="0">
-                <a:solidFill>
-                  <a:srgbClr val="0065BD"/>
-                </a:solidFill>
-                <a:latin typeface="Calibri" pitchFamily="34" charset="0"/>
-              </a:endParaRPr>
             </a:p>
           </p:txBody>
         </p:sp>
@@ -7282,85 +7249,84 @@
             <a:pPr marL="457200" indent="-457200" algn="just"/>
             <a:r>
               <a:rPr lang="en-US" dirty="0" smtClean="0"/>
-              <a:t>Type</a:t>
-            </a:r>
+              <a:t>Type: Identifies the operation</a:t>
+            </a:r>
+          </a:p>
+          <a:p>
+            <a:pPr marL="457200" indent="-457200" algn="just"/>
             <a:r>
               <a:rPr lang="en-US" dirty="0" smtClean="0"/>
-              <a:t>: Identifies the operation</a:t>
+              <a:t>Code: Indicates request, response or additional options for a given type.</a:t>
             </a:r>
           </a:p>
           <a:p>
             <a:pPr marL="457200" indent="-457200" algn="just"/>
             <a:r>
               <a:rPr lang="en-US" dirty="0" smtClean="0"/>
-              <a:t>Code: Indicates request, response or additional options for a given type</a:t>
+              <a:t>TLV information { </a:t>
             </a:r>
             <a:r>
               <a:rPr lang="en-US" dirty="0" smtClean="0"/>
-              <a:t>.</a:t>
-            </a:r>
-          </a:p>
-          <a:p>
-            <a:pPr marL="457200" indent="-457200" algn="just"/>
+              <a:t>T[1Byte]  L [4Bytes]  V[Variable] </a:t>
+            </a:r>
             <a:r>
               <a:rPr lang="en-US" dirty="0" smtClean="0"/>
-              <a:t>TLV information { T[5 bits]  L [4 bits]  V[..] }</a:t>
-            </a:r>
-            <a:endParaRPr lang="en-US" dirty="0" smtClean="0"/>
+              <a:t>}</a:t>
+            </a:r>
           </a:p>
         </p:txBody>
       </p:sp>
       <p:graphicFrame>
         <p:nvGraphicFramePr>
-          <p:cNvPr id="11" name="Table 10"/>
+          <p:cNvPr id="10" name="Table 9"/>
           <p:cNvGraphicFramePr>
             <a:graphicFrameLocks noGrp="1"/>
           </p:cNvGraphicFramePr>
           <p:nvPr/>
         </p:nvGraphicFramePr>
         <p:xfrm>
-          <a:off x="1295390" y="3581400"/>
-          <a:ext cx="6705610" cy="1905000"/>
+          <a:off x="1066802" y="3467100"/>
+          <a:ext cx="7010398" cy="2267176"/>
         </p:xfrm>
         <a:graphic>
           <a:graphicData uri="http://schemas.openxmlformats.org/drawingml/2006/table">
             <a:tbl>
               <a:tblPr/>
               <a:tblGrid>
-                <a:gridCol w="200366"/>
-                <a:gridCol w="200366"/>
-                <a:gridCol w="200366"/>
-                <a:gridCol w="200366"/>
-                <a:gridCol w="200366"/>
-                <a:gridCol w="200366"/>
-                <a:gridCol w="200366"/>
-                <a:gridCol w="200366"/>
-                <a:gridCol w="200366"/>
-                <a:gridCol w="200366"/>
-                <a:gridCol w="213725"/>
-                <a:gridCol w="213725"/>
-                <a:gridCol w="213725"/>
-                <a:gridCol w="213725"/>
-                <a:gridCol w="213725"/>
-                <a:gridCol w="213725"/>
-                <a:gridCol w="213725"/>
-                <a:gridCol w="213725"/>
-                <a:gridCol w="213725"/>
-                <a:gridCol w="213725"/>
-                <a:gridCol w="213725"/>
-                <a:gridCol w="213725"/>
-                <a:gridCol w="213725"/>
-                <a:gridCol w="213725"/>
-                <a:gridCol w="213725"/>
-                <a:gridCol w="213725"/>
-                <a:gridCol w="213725"/>
-                <a:gridCol w="213725"/>
-                <a:gridCol w="213725"/>
-                <a:gridCol w="213725"/>
-                <a:gridCol w="213725"/>
-                <a:gridCol w="213725"/>
+                <a:gridCol w="209474"/>
+                <a:gridCol w="209474"/>
+                <a:gridCol w="209474"/>
+                <a:gridCol w="209474"/>
+                <a:gridCol w="209474"/>
+                <a:gridCol w="209474"/>
+                <a:gridCol w="209474"/>
+                <a:gridCol w="209474"/>
+                <a:gridCol w="209474"/>
+                <a:gridCol w="209474"/>
+                <a:gridCol w="223439"/>
+                <a:gridCol w="223439"/>
+                <a:gridCol w="223439"/>
+                <a:gridCol w="223439"/>
+                <a:gridCol w="223439"/>
+                <a:gridCol w="223439"/>
+                <a:gridCol w="223439"/>
+                <a:gridCol w="223439"/>
+                <a:gridCol w="223439"/>
+                <a:gridCol w="223439"/>
+                <a:gridCol w="223439"/>
+                <a:gridCol w="223439"/>
+                <a:gridCol w="223439"/>
+                <a:gridCol w="223439"/>
+                <a:gridCol w="223439"/>
+                <a:gridCol w="223439"/>
+                <a:gridCol w="223439"/>
+                <a:gridCol w="223439"/>
+                <a:gridCol w="223439"/>
+                <a:gridCol w="223439"/>
+                <a:gridCol w="223439"/>
+                <a:gridCol w="223439"/>
               </a:tblGrid>
-              <a:tr h="246945">
+              <a:tr h="261598">
                 <a:tc>
                   <a:txBody>
                     <a:bodyPr/>
@@ -8356,7 +8322,7 @@
                     <a:p>
                       <a:pPr algn="ctr" fontAlgn="ctr"/>
                       <a:r>
-                        <a:rPr lang="en-US" sz="900" b="0" i="0" u="none" strike="noStrike">
+                        <a:rPr lang="en-US" sz="900" b="0" i="0" u="none" strike="noStrike" dirty="0">
                           <a:solidFill>
                             <a:srgbClr val="000000"/>
                           </a:solidFill>
@@ -8578,7 +8544,7 @@
                   </a:tcPr>
                 </a:tc>
               </a:tr>
-              <a:tr h="235185">
+              <a:tr h="249140">
                 <a:tc gridSpan="4">
                   <a:txBody>
                     <a:bodyPr/>
@@ -8586,7 +8552,7 @@
                     <a:p>
                       <a:pPr algn="ctr" fontAlgn="b"/>
                       <a:r>
-                        <a:rPr lang="en-US" sz="1100" b="0" i="0" u="none" strike="noStrike" dirty="0" smtClean="0">
+                        <a:rPr lang="en-US" sz="1100" b="0" i="0" u="none" strike="noStrike">
                           <a:solidFill>
                             <a:srgbClr val="000000"/>
                           </a:solidFill>
@@ -8594,12 +8560,6 @@
                         </a:rPr>
                         <a:t>Version</a:t>
                       </a:r>
-                      <a:endParaRPr lang="en-US" sz="1100" b="0" i="0" u="none" strike="noStrike" dirty="0">
-                        <a:solidFill>
-                          <a:srgbClr val="000000"/>
-                        </a:solidFill>
-                        <a:latin typeface="Calibri"/>
-                      </a:endParaRPr>
                     </a:p>
                   </a:txBody>
                   <a:tcPr marL="9108" marR="9108" marT="9108" marB="0" anchor="b">
@@ -8678,7 +8638,7 @@
                     <a:p>
                       <a:pPr algn="ctr" fontAlgn="b"/>
                       <a:r>
-                        <a:rPr lang="en-US" sz="1100" b="0" i="0" u="none" strike="noStrike" dirty="0" smtClean="0">
+                        <a:rPr lang="en-US" sz="1100" b="0" i="0" u="none" strike="noStrike">
                           <a:solidFill>
                             <a:srgbClr val="000000"/>
                           </a:solidFill>
@@ -8686,12 +8646,6 @@
                         </a:rPr>
                         <a:t>Flags</a:t>
                       </a:r>
-                      <a:endParaRPr lang="en-US" sz="1100" b="0" i="0" u="none" strike="noStrike" dirty="0">
-                        <a:solidFill>
-                          <a:srgbClr val="000000"/>
-                        </a:solidFill>
-                        <a:latin typeface="Calibri"/>
-                      </a:endParaRPr>
                     </a:p>
                   </a:txBody>
                   <a:tcPr marL="9108" marR="9108" marT="9108" marB="0" anchor="b">
@@ -8763,7 +8717,7 @@
                   </a:txBody>
                   <a:tcPr/>
                 </a:tc>
-                <a:tc gridSpan="3">
+                <a:tc gridSpan="8">
                   <a:txBody>
                     <a:bodyPr/>
                     <a:lstStyle/>
@@ -8776,7 +8730,7 @@
                           </a:solidFill>
                           <a:latin typeface="Calibri"/>
                         </a:rPr>
-                        <a:t>Exp</a:t>
+                        <a:t>Next TLV Type</a:t>
                       </a:r>
                     </a:p>
                   </a:txBody>
@@ -8839,7 +8793,57 @@
                   </a:txBody>
                   <a:tcPr/>
                 </a:tc>
-                <a:tc gridSpan="5">
+                <a:tc hMerge="1">
+                  <a:txBody>
+                    <a:bodyPr/>
+                    <a:lstStyle/>
+                    <a:p>
+                      <a:endParaRPr lang="en-US"/>
+                    </a:p>
+                  </a:txBody>
+                  <a:tcPr/>
+                </a:tc>
+                <a:tc hMerge="1">
+                  <a:txBody>
+                    <a:bodyPr/>
+                    <a:lstStyle/>
+                    <a:p>
+                      <a:endParaRPr lang="en-US"/>
+                    </a:p>
+                  </a:txBody>
+                  <a:tcPr/>
+                </a:tc>
+                <a:tc hMerge="1">
+                  <a:txBody>
+                    <a:bodyPr/>
+                    <a:lstStyle/>
+                    <a:p>
+                      <a:endParaRPr lang="en-US"/>
+                    </a:p>
+                  </a:txBody>
+                  <a:tcPr/>
+                </a:tc>
+                <a:tc hMerge="1">
+                  <a:txBody>
+                    <a:bodyPr/>
+                    <a:lstStyle/>
+                    <a:p>
+                      <a:endParaRPr lang="en-US"/>
+                    </a:p>
+                  </a:txBody>
+                  <a:tcPr/>
+                </a:tc>
+                <a:tc hMerge="1">
+                  <a:txBody>
+                    <a:bodyPr/>
+                    <a:lstStyle/>
+                    <a:p>
+                      <a:endParaRPr lang="en-US"/>
+                    </a:p>
+                  </a:txBody>
+                  <a:tcPr/>
+                </a:tc>
+                <a:tc gridSpan="16">
                   <a:txBody>
                     <a:bodyPr/>
                     <a:lstStyle/>
@@ -8852,103 +8856,7 @@
                           </a:solidFill>
                           <a:latin typeface="Calibri"/>
                         </a:rPr>
-                        <a:t>N.Header Type</a:t>
-                      </a:r>
-                    </a:p>
-                  </a:txBody>
-                  <a:tcPr marL="9108" marR="9108" marT="9108" marB="0" anchor="b">
-                    <a:lnL w="6350" cap="flat" cmpd="sng" algn="ctr">
-                      <a:solidFill>
-                        <a:srgbClr val="000000"/>
-                      </a:solidFill>
-                      <a:prstDash val="solid"/>
-                      <a:round/>
-                      <a:headEnd type="none" w="med" len="med"/>
-                      <a:tailEnd type="none" w="med" len="med"/>
-                    </a:lnL>
-                    <a:lnR w="6350" cap="flat" cmpd="sng" algn="ctr">
-                      <a:solidFill>
-                        <a:srgbClr val="000000"/>
-                      </a:solidFill>
-                      <a:prstDash val="solid"/>
-                      <a:round/>
-                      <a:headEnd type="none" w="med" len="med"/>
-                      <a:tailEnd type="none" w="med" len="med"/>
-                    </a:lnR>
-                    <a:lnT w="12700" cap="flat" cmpd="sng" algn="ctr">
-                      <a:solidFill>
-                        <a:srgbClr val="000000"/>
-                      </a:solidFill>
-                      <a:prstDash val="solid"/>
-                      <a:round/>
-                      <a:headEnd type="none" w="med" len="med"/>
-                      <a:tailEnd type="none" w="med" len="med"/>
-                    </a:lnT>
-                    <a:lnB w="6350" cap="flat" cmpd="sng" algn="ctr">
-                      <a:solidFill>
-                        <a:srgbClr val="000000"/>
-                      </a:solidFill>
-                      <a:prstDash val="solid"/>
-                      <a:round/>
-                      <a:headEnd type="none" w="med" len="med"/>
-                      <a:tailEnd type="none" w="med" len="med"/>
-                    </a:lnB>
-                  </a:tcPr>
-                </a:tc>
-                <a:tc hMerge="1">
-                  <a:txBody>
-                    <a:bodyPr/>
-                    <a:lstStyle/>
-                    <a:p>
-                      <a:endParaRPr lang="en-US"/>
-                    </a:p>
-                  </a:txBody>
-                  <a:tcPr/>
-                </a:tc>
-                <a:tc hMerge="1">
-                  <a:txBody>
-                    <a:bodyPr/>
-                    <a:lstStyle/>
-                    <a:p>
-                      <a:endParaRPr lang="en-US"/>
-                    </a:p>
-                  </a:txBody>
-                  <a:tcPr/>
-                </a:tc>
-                <a:tc hMerge="1">
-                  <a:txBody>
-                    <a:bodyPr/>
-                    <a:lstStyle/>
-                    <a:p>
-                      <a:endParaRPr lang="en-US"/>
-                    </a:p>
-                  </a:txBody>
-                  <a:tcPr/>
-                </a:tc>
-                <a:tc hMerge="1">
-                  <a:txBody>
-                    <a:bodyPr/>
-                    <a:lstStyle/>
-                    <a:p>
-                      <a:endParaRPr lang="en-US"/>
-                    </a:p>
-                  </a:txBody>
-                  <a:tcPr/>
-                </a:tc>
-                <a:tc gridSpan="16">
-                  <a:txBody>
-                    <a:bodyPr/>
-                    <a:lstStyle/>
-                    <a:p>
-                      <a:pPr algn="ctr" fontAlgn="b"/>
-                      <a:r>
-                        <a:rPr lang="en-US" sz="1100" b="0" i="0" u="none" strike="noStrike">
-                          <a:solidFill>
-                            <a:srgbClr val="000000"/>
-                          </a:solidFill>
-                          <a:latin typeface="Calibri"/>
-                        </a:rPr>
-                        <a:t>Sender ID</a:t>
+                        <a:t>Source Sender ID</a:t>
                       </a:r>
                     </a:p>
                   </a:txBody>
@@ -9142,7 +9050,7 @@
                   <a:tcPr/>
                 </a:tc>
               </a:tr>
-              <a:tr h="235185">
+              <a:tr h="249140">
                 <a:tc gridSpan="16">
                   <a:txBody>
                     <a:bodyPr/>
@@ -9156,7 +9064,7 @@
                           </a:solidFill>
                           <a:latin typeface="Calibri"/>
                         </a:rPr>
-                        <a:t>Local Session ID</a:t>
+                        <a:t>Source Session ID</a:t>
                       </a:r>
                     </a:p>
                   </a:txBody>
@@ -9362,7 +9270,7 @@
                           </a:solidFill>
                           <a:latin typeface="Calibri"/>
                         </a:rPr>
-                        <a:t>Remote Session ID</a:t>
+                        <a:t>Destination Session ID</a:t>
                       </a:r>
                     </a:p>
                   </a:txBody>
@@ -9556,7 +9464,7 @@
                   <a:tcPr/>
                 </a:tc>
               </a:tr>
-              <a:tr h="235185">
+              <a:tr h="249140">
                 <a:tc gridSpan="32">
                   <a:txBody>
                     <a:bodyPr/>
@@ -9924,7 +9832,375 @@
                   <a:tcPr/>
                 </a:tc>
               </a:tr>
-              <a:tr h="235185">
+              <a:tr h="249140">
+                <a:tc gridSpan="32">
+                  <a:txBody>
+                    <a:bodyPr/>
+                    <a:lstStyle/>
+                    <a:p>
+                      <a:pPr algn="ctr" fontAlgn="b"/>
+                      <a:r>
+                        <a:rPr lang="en-US" sz="1100" b="0" i="0" u="none" strike="noStrike">
+                          <a:solidFill>
+                            <a:srgbClr val="000000"/>
+                          </a:solidFill>
+                          <a:latin typeface="Calibri"/>
+                        </a:rPr>
+                        <a:t>ACK</a:t>
+                      </a:r>
+                    </a:p>
+                  </a:txBody>
+                  <a:tcPr marL="9108" marR="9108" marT="9108" marB="0" anchor="b">
+                    <a:lnL w="12700" cap="flat" cmpd="sng" algn="ctr">
+                      <a:solidFill>
+                        <a:srgbClr val="000000"/>
+                      </a:solidFill>
+                      <a:prstDash val="solid"/>
+                      <a:round/>
+                      <a:headEnd type="none" w="med" len="med"/>
+                      <a:tailEnd type="none" w="med" len="med"/>
+                    </a:lnL>
+                    <a:lnR w="12700" cap="flat" cmpd="sng" algn="ctr">
+                      <a:solidFill>
+                        <a:srgbClr val="000000"/>
+                      </a:solidFill>
+                      <a:prstDash val="solid"/>
+                      <a:round/>
+                      <a:headEnd type="none" w="med" len="med"/>
+                      <a:tailEnd type="none" w="med" len="med"/>
+                    </a:lnR>
+                    <a:lnT w="6350" cap="flat" cmpd="sng" algn="ctr">
+                      <a:solidFill>
+                        <a:srgbClr val="000000"/>
+                      </a:solidFill>
+                      <a:prstDash val="solid"/>
+                      <a:round/>
+                      <a:headEnd type="none" w="med" len="med"/>
+                      <a:tailEnd type="none" w="med" len="med"/>
+                    </a:lnT>
+                    <a:lnB w="6350" cap="flat" cmpd="sng" algn="ctr">
+                      <a:solidFill>
+                        <a:srgbClr val="000000"/>
+                      </a:solidFill>
+                      <a:prstDash val="solid"/>
+                      <a:round/>
+                      <a:headEnd type="none" w="med" len="med"/>
+                      <a:tailEnd type="none" w="med" len="med"/>
+                    </a:lnB>
+                  </a:tcPr>
+                </a:tc>
+                <a:tc hMerge="1">
+                  <a:txBody>
+                    <a:bodyPr/>
+                    <a:lstStyle/>
+                    <a:p>
+                      <a:endParaRPr lang="en-US"/>
+                    </a:p>
+                  </a:txBody>
+                  <a:tcPr/>
+                </a:tc>
+                <a:tc hMerge="1">
+                  <a:txBody>
+                    <a:bodyPr/>
+                    <a:lstStyle/>
+                    <a:p>
+                      <a:endParaRPr lang="en-US"/>
+                    </a:p>
+                  </a:txBody>
+                  <a:tcPr/>
+                </a:tc>
+                <a:tc hMerge="1">
+                  <a:txBody>
+                    <a:bodyPr/>
+                    <a:lstStyle/>
+                    <a:p>
+                      <a:endParaRPr lang="en-US"/>
+                    </a:p>
+                  </a:txBody>
+                  <a:tcPr/>
+                </a:tc>
+                <a:tc hMerge="1">
+                  <a:txBody>
+                    <a:bodyPr/>
+                    <a:lstStyle/>
+                    <a:p>
+                      <a:endParaRPr lang="en-US"/>
+                    </a:p>
+                  </a:txBody>
+                  <a:tcPr/>
+                </a:tc>
+                <a:tc hMerge="1">
+                  <a:txBody>
+                    <a:bodyPr/>
+                    <a:lstStyle/>
+                    <a:p>
+                      <a:endParaRPr lang="en-US"/>
+                    </a:p>
+                  </a:txBody>
+                  <a:tcPr/>
+                </a:tc>
+                <a:tc hMerge="1">
+                  <a:txBody>
+                    <a:bodyPr/>
+                    <a:lstStyle/>
+                    <a:p>
+                      <a:endParaRPr lang="en-US"/>
+                    </a:p>
+                  </a:txBody>
+                  <a:tcPr/>
+                </a:tc>
+                <a:tc hMerge="1">
+                  <a:txBody>
+                    <a:bodyPr/>
+                    <a:lstStyle/>
+                    <a:p>
+                      <a:endParaRPr lang="en-US"/>
+                    </a:p>
+                  </a:txBody>
+                  <a:tcPr/>
+                </a:tc>
+                <a:tc hMerge="1">
+                  <a:txBody>
+                    <a:bodyPr/>
+                    <a:lstStyle/>
+                    <a:p>
+                      <a:endParaRPr lang="en-US"/>
+                    </a:p>
+                  </a:txBody>
+                  <a:tcPr/>
+                </a:tc>
+                <a:tc hMerge="1">
+                  <a:txBody>
+                    <a:bodyPr/>
+                    <a:lstStyle/>
+                    <a:p>
+                      <a:endParaRPr lang="en-US"/>
+                    </a:p>
+                  </a:txBody>
+                  <a:tcPr/>
+                </a:tc>
+                <a:tc hMerge="1">
+                  <a:txBody>
+                    <a:bodyPr/>
+                    <a:lstStyle/>
+                    <a:p>
+                      <a:endParaRPr lang="en-US"/>
+                    </a:p>
+                  </a:txBody>
+                  <a:tcPr/>
+                </a:tc>
+                <a:tc hMerge="1">
+                  <a:txBody>
+                    <a:bodyPr/>
+                    <a:lstStyle/>
+                    <a:p>
+                      <a:endParaRPr lang="en-US"/>
+                    </a:p>
+                  </a:txBody>
+                  <a:tcPr/>
+                </a:tc>
+                <a:tc hMerge="1">
+                  <a:txBody>
+                    <a:bodyPr/>
+                    <a:lstStyle/>
+                    <a:p>
+                      <a:endParaRPr lang="en-US"/>
+                    </a:p>
+                  </a:txBody>
+                  <a:tcPr/>
+                </a:tc>
+                <a:tc hMerge="1">
+                  <a:txBody>
+                    <a:bodyPr/>
+                    <a:lstStyle/>
+                    <a:p>
+                      <a:endParaRPr lang="en-US"/>
+                    </a:p>
+                  </a:txBody>
+                  <a:tcPr/>
+                </a:tc>
+                <a:tc hMerge="1">
+                  <a:txBody>
+                    <a:bodyPr/>
+                    <a:lstStyle/>
+                    <a:p>
+                      <a:endParaRPr lang="en-US"/>
+                    </a:p>
+                  </a:txBody>
+                  <a:tcPr/>
+                </a:tc>
+                <a:tc hMerge="1">
+                  <a:txBody>
+                    <a:bodyPr/>
+                    <a:lstStyle/>
+                    <a:p>
+                      <a:endParaRPr lang="en-US"/>
+                    </a:p>
+                  </a:txBody>
+                  <a:tcPr/>
+                </a:tc>
+                <a:tc hMerge="1">
+                  <a:txBody>
+                    <a:bodyPr/>
+                    <a:lstStyle/>
+                    <a:p>
+                      <a:endParaRPr lang="en-US"/>
+                    </a:p>
+                  </a:txBody>
+                  <a:tcPr/>
+                </a:tc>
+                <a:tc hMerge="1">
+                  <a:txBody>
+                    <a:bodyPr/>
+                    <a:lstStyle/>
+                    <a:p>
+                      <a:endParaRPr lang="en-US"/>
+                    </a:p>
+                  </a:txBody>
+                  <a:tcPr/>
+                </a:tc>
+                <a:tc hMerge="1">
+                  <a:txBody>
+                    <a:bodyPr/>
+                    <a:lstStyle/>
+                    <a:p>
+                      <a:endParaRPr lang="en-US"/>
+                    </a:p>
+                  </a:txBody>
+                  <a:tcPr/>
+                </a:tc>
+                <a:tc hMerge="1">
+                  <a:txBody>
+                    <a:bodyPr/>
+                    <a:lstStyle/>
+                    <a:p>
+                      <a:endParaRPr lang="en-US"/>
+                    </a:p>
+                  </a:txBody>
+                  <a:tcPr/>
+                </a:tc>
+                <a:tc hMerge="1">
+                  <a:txBody>
+                    <a:bodyPr/>
+                    <a:lstStyle/>
+                    <a:p>
+                      <a:endParaRPr lang="en-US"/>
+                    </a:p>
+                  </a:txBody>
+                  <a:tcPr/>
+                </a:tc>
+                <a:tc hMerge="1">
+                  <a:txBody>
+                    <a:bodyPr/>
+                    <a:lstStyle/>
+                    <a:p>
+                      <a:endParaRPr lang="en-US"/>
+                    </a:p>
+                  </a:txBody>
+                  <a:tcPr/>
+                </a:tc>
+                <a:tc hMerge="1">
+                  <a:txBody>
+                    <a:bodyPr/>
+                    <a:lstStyle/>
+                    <a:p>
+                      <a:endParaRPr lang="en-US"/>
+                    </a:p>
+                  </a:txBody>
+                  <a:tcPr/>
+                </a:tc>
+                <a:tc hMerge="1">
+                  <a:txBody>
+                    <a:bodyPr/>
+                    <a:lstStyle/>
+                    <a:p>
+                      <a:endParaRPr lang="en-US"/>
+                    </a:p>
+                  </a:txBody>
+                  <a:tcPr/>
+                </a:tc>
+                <a:tc hMerge="1">
+                  <a:txBody>
+                    <a:bodyPr/>
+                    <a:lstStyle/>
+                    <a:p>
+                      <a:endParaRPr lang="en-US"/>
+                    </a:p>
+                  </a:txBody>
+                  <a:tcPr/>
+                </a:tc>
+                <a:tc hMerge="1">
+                  <a:txBody>
+                    <a:bodyPr/>
+                    <a:lstStyle/>
+                    <a:p>
+                      <a:endParaRPr lang="en-US"/>
+                    </a:p>
+                  </a:txBody>
+                  <a:tcPr/>
+                </a:tc>
+                <a:tc hMerge="1">
+                  <a:txBody>
+                    <a:bodyPr/>
+                    <a:lstStyle/>
+                    <a:p>
+                      <a:endParaRPr lang="en-US"/>
+                    </a:p>
+                  </a:txBody>
+                  <a:tcPr/>
+                </a:tc>
+                <a:tc hMerge="1">
+                  <a:txBody>
+                    <a:bodyPr/>
+                    <a:lstStyle/>
+                    <a:p>
+                      <a:endParaRPr lang="en-US"/>
+                    </a:p>
+                  </a:txBody>
+                  <a:tcPr/>
+                </a:tc>
+                <a:tc hMerge="1">
+                  <a:txBody>
+                    <a:bodyPr/>
+                    <a:lstStyle/>
+                    <a:p>
+                      <a:endParaRPr lang="en-US"/>
+                    </a:p>
+                  </a:txBody>
+                  <a:tcPr/>
+                </a:tc>
+                <a:tc hMerge="1">
+                  <a:txBody>
+                    <a:bodyPr/>
+                    <a:lstStyle/>
+                    <a:p>
+                      <a:endParaRPr lang="en-US"/>
+                    </a:p>
+                  </a:txBody>
+                  <a:tcPr/>
+                </a:tc>
+                <a:tc hMerge="1">
+                  <a:txBody>
+                    <a:bodyPr/>
+                    <a:lstStyle/>
+                    <a:p>
+                      <a:endParaRPr lang="en-US"/>
+                    </a:p>
+                  </a:txBody>
+                  <a:tcPr/>
+                </a:tc>
+                <a:tc hMerge="1">
+                  <a:txBody>
+                    <a:bodyPr/>
+                    <a:lstStyle/>
+                    <a:p>
+                      <a:endParaRPr lang="en-US"/>
+                    </a:p>
+                  </a:txBody>
+                  <a:tcPr/>
+                </a:tc>
+              </a:tr>
+              <a:tr h="249140">
                 <a:tc gridSpan="8">
                   <a:txBody>
                     <a:bodyPr/>
@@ -10384,7 +10660,7 @@
                   <a:tcPr/>
                 </a:tc>
               </a:tr>
-              <a:tr h="235185">
+              <a:tr h="249140">
                 <a:tc gridSpan="32">
                   <a:txBody>
                     <a:bodyPr/>
@@ -10752,7 +11028,7 @@
                   <a:tcPr/>
                 </a:tc>
               </a:tr>
-              <a:tr h="235185">
+              <a:tr h="249140">
                 <a:tc gridSpan="32">
                   <a:txBody>
                     <a:bodyPr/>
@@ -10760,7 +11036,7 @@
                     <a:p>
                       <a:pPr algn="ctr" fontAlgn="b"/>
                       <a:r>
-                        <a:rPr lang="en-US" sz="1100" b="0" i="0" u="none" strike="noStrike">
+                        <a:rPr lang="en-US" sz="1100" b="0" i="0" u="none" strike="noStrike" dirty="0">
                           <a:solidFill>
                             <a:srgbClr val="000000"/>
                           </a:solidFill>
@@ -11120,7 +11396,7 @@
                   <a:tcPr/>
                 </a:tc>
               </a:tr>
-              <a:tr h="246945">
+              <a:tr h="261598">
                 <a:tc gridSpan="32">
                   <a:txBody>
                     <a:bodyPr/>

</xml_diff>